<commit_message>
Coord sys section and removed wavy red lines from ppt.
</commit_message>
<xml_diff>
--- a/Images/CoordSys/CoordSys.pptx
+++ b/Images/CoordSys/CoordSys.pptx
@@ -247,7 +247,7 @@
           <a:p>
             <a:fld id="{3059B378-B3A7-634A-B891-3FD0CA99752F}" type="datetimeFigureOut">
               <a:rPr lang="en-US" smtClean="0"/>
-              <a:t>4/25/17</a:t>
+              <a:t>8/24/17</a:t>
             </a:fld>
             <a:endParaRPr lang="en-US"/>
           </a:p>
@@ -417,7 +417,7 @@
           <a:p>
             <a:fld id="{3059B378-B3A7-634A-B891-3FD0CA99752F}" type="datetimeFigureOut">
               <a:rPr lang="en-US" smtClean="0"/>
-              <a:t>4/25/17</a:t>
+              <a:t>8/24/17</a:t>
             </a:fld>
             <a:endParaRPr lang="en-US"/>
           </a:p>
@@ -597,7 +597,7 @@
           <a:p>
             <a:fld id="{3059B378-B3A7-634A-B891-3FD0CA99752F}" type="datetimeFigureOut">
               <a:rPr lang="en-US" smtClean="0"/>
-              <a:t>4/25/17</a:t>
+              <a:t>8/24/17</a:t>
             </a:fld>
             <a:endParaRPr lang="en-US"/>
           </a:p>
@@ -767,7 +767,7 @@
           <a:p>
             <a:fld id="{3059B378-B3A7-634A-B891-3FD0CA99752F}" type="datetimeFigureOut">
               <a:rPr lang="en-US" smtClean="0"/>
-              <a:t>4/25/17</a:t>
+              <a:t>8/24/17</a:t>
             </a:fld>
             <a:endParaRPr lang="en-US"/>
           </a:p>
@@ -1013,7 +1013,7 @@
           <a:p>
             <a:fld id="{3059B378-B3A7-634A-B891-3FD0CA99752F}" type="datetimeFigureOut">
               <a:rPr lang="en-US" smtClean="0"/>
-              <a:t>4/25/17</a:t>
+              <a:t>8/24/17</a:t>
             </a:fld>
             <a:endParaRPr lang="en-US"/>
           </a:p>
@@ -1245,7 +1245,7 @@
           <a:p>
             <a:fld id="{3059B378-B3A7-634A-B891-3FD0CA99752F}" type="datetimeFigureOut">
               <a:rPr lang="en-US" smtClean="0"/>
-              <a:t>4/25/17</a:t>
+              <a:t>8/24/17</a:t>
             </a:fld>
             <a:endParaRPr lang="en-US"/>
           </a:p>
@@ -1612,7 +1612,7 @@
           <a:p>
             <a:fld id="{3059B378-B3A7-634A-B891-3FD0CA99752F}" type="datetimeFigureOut">
               <a:rPr lang="en-US" smtClean="0"/>
-              <a:t>4/25/17</a:t>
+              <a:t>8/24/17</a:t>
             </a:fld>
             <a:endParaRPr lang="en-US"/>
           </a:p>
@@ -1730,7 +1730,7 @@
           <a:p>
             <a:fld id="{3059B378-B3A7-634A-B891-3FD0CA99752F}" type="datetimeFigureOut">
               <a:rPr lang="en-US" smtClean="0"/>
-              <a:t>4/25/17</a:t>
+              <a:t>8/24/17</a:t>
             </a:fld>
             <a:endParaRPr lang="en-US"/>
           </a:p>
@@ -1825,7 +1825,7 @@
           <a:p>
             <a:fld id="{3059B378-B3A7-634A-B891-3FD0CA99752F}" type="datetimeFigureOut">
               <a:rPr lang="en-US" smtClean="0"/>
-              <a:t>4/25/17</a:t>
+              <a:t>8/24/17</a:t>
             </a:fld>
             <a:endParaRPr lang="en-US"/>
           </a:p>
@@ -2102,7 +2102,7 @@
           <a:p>
             <a:fld id="{3059B378-B3A7-634A-B891-3FD0CA99752F}" type="datetimeFigureOut">
               <a:rPr lang="en-US" smtClean="0"/>
-              <a:t>4/25/17</a:t>
+              <a:t>8/24/17</a:t>
             </a:fld>
             <a:endParaRPr lang="en-US"/>
           </a:p>
@@ -2355,7 +2355,7 @@
           <a:p>
             <a:fld id="{3059B378-B3A7-634A-B891-3FD0CA99752F}" type="datetimeFigureOut">
               <a:rPr lang="en-US" smtClean="0"/>
-              <a:t>4/25/17</a:t>
+              <a:t>8/24/17</a:t>
             </a:fld>
             <a:endParaRPr lang="en-US"/>
           </a:p>
@@ -2568,7 +2568,7 @@
           <a:p>
             <a:fld id="{3059B378-B3A7-634A-B891-3FD0CA99752F}" type="datetimeFigureOut">
               <a:rPr lang="en-US" smtClean="0"/>
-              <a:t>4/25/17</a:t>
+              <a:t>8/24/17</a:t>
             </a:fld>
             <a:endParaRPr lang="en-US"/>
           </a:p>
@@ -4559,6 +4559,79 @@
           </a:p>
         </p:txBody>
       </p:sp>
+      <p:sp>
+        <p:nvSpPr>
+          <p:cNvPr id="3" name="Arc 2"/>
+          <p:cNvSpPr/>
+          <p:nvPr/>
+        </p:nvSpPr>
+        <p:spPr>
+          <a:xfrm>
+            <a:off x="2736701" y="5405156"/>
+            <a:ext cx="143435" cy="322394"/>
+          </a:xfrm>
+          <a:prstGeom prst="arc">
+            <a:avLst/>
+          </a:prstGeom>
+          <a:ln w="38100">
+            <a:solidFill>
+              <a:schemeClr val="tx1"/>
+            </a:solidFill>
+          </a:ln>
+        </p:spPr>
+        <p:style>
+          <a:lnRef idx="1">
+            <a:schemeClr val="accent1"/>
+          </a:lnRef>
+          <a:fillRef idx="0">
+            <a:schemeClr val="accent1"/>
+          </a:fillRef>
+          <a:effectRef idx="0">
+            <a:schemeClr val="accent1"/>
+          </a:effectRef>
+          <a:fontRef idx="minor">
+            <a:schemeClr val="tx1"/>
+          </a:fontRef>
+        </p:style>
+        <p:txBody>
+          <a:bodyPr rtlCol="0" anchor="ctr"/>
+          <a:lstStyle/>
+          <a:p>
+            <a:pPr algn="ctr"/>
+            <a:endParaRPr lang="en-US"/>
+          </a:p>
+        </p:txBody>
+      </p:sp>
+      <p:sp>
+        <p:nvSpPr>
+          <p:cNvPr id="5" name="TextBox 4"/>
+          <p:cNvSpPr txBox="1"/>
+          <p:nvPr/>
+        </p:nvSpPr>
+        <p:spPr>
+          <a:xfrm>
+            <a:off x="2880136" y="5276365"/>
+            <a:ext cx="308098" cy="369332"/>
+          </a:xfrm>
+          <a:prstGeom prst="rect">
+            <a:avLst/>
+          </a:prstGeom>
+          <a:noFill/>
+        </p:spPr>
+        <p:txBody>
+          <a:bodyPr wrap="none" rtlCol="0">
+            <a:spAutoFit/>
+          </a:bodyPr>
+          <a:lstStyle/>
+          <a:p>
+            <a:r>
+              <a:rPr lang="en-US" smtClean="0"/>
+              <a:t>θ</a:t>
+            </a:r>
+            <a:endParaRPr lang="en-US" dirty="0"/>
+          </a:p>
+        </p:txBody>
+      </p:sp>
     </p:spTree>
     <p:extLst>
       <p:ext uri="{BB962C8B-B14F-4D97-AF65-F5344CB8AC3E}">

</xml_diff>

<commit_message>
Added note regarding the updated coordinate systems in the track fitting.
</commit_message>
<xml_diff>
--- a/Images/CoordSys/CoordSys.pptx
+++ b/Images/CoordSys/CoordSys.pptx
@@ -10,6 +10,7 @@
     <p:sldId id="258" r:id="rId4"/>
     <p:sldId id="259" r:id="rId5"/>
     <p:sldId id="260" r:id="rId6"/>
+    <p:sldId id="261" r:id="rId7"/>
   </p:sldIdLst>
   <p:sldSz cx="12192000" cy="6858000"/>
   <p:notesSz cx="6858000" cy="9144000"/>
@@ -247,7 +248,7 @@
           <a:p>
             <a:fld id="{3059B378-B3A7-634A-B891-3FD0CA99752F}" type="datetimeFigureOut">
               <a:rPr lang="en-US" smtClean="0"/>
-              <a:t>8/24/17</a:t>
+              <a:t>12/8/17</a:t>
             </a:fld>
             <a:endParaRPr lang="en-US"/>
           </a:p>
@@ -417,7 +418,7 @@
           <a:p>
             <a:fld id="{3059B378-B3A7-634A-B891-3FD0CA99752F}" type="datetimeFigureOut">
               <a:rPr lang="en-US" smtClean="0"/>
-              <a:t>8/24/17</a:t>
+              <a:t>12/8/17</a:t>
             </a:fld>
             <a:endParaRPr lang="en-US"/>
           </a:p>
@@ -597,7 +598,7 @@
           <a:p>
             <a:fld id="{3059B378-B3A7-634A-B891-3FD0CA99752F}" type="datetimeFigureOut">
               <a:rPr lang="en-US" smtClean="0"/>
-              <a:t>8/24/17</a:t>
+              <a:t>12/8/17</a:t>
             </a:fld>
             <a:endParaRPr lang="en-US"/>
           </a:p>
@@ -767,7 +768,7 @@
           <a:p>
             <a:fld id="{3059B378-B3A7-634A-B891-3FD0CA99752F}" type="datetimeFigureOut">
               <a:rPr lang="en-US" smtClean="0"/>
-              <a:t>8/24/17</a:t>
+              <a:t>12/8/17</a:t>
             </a:fld>
             <a:endParaRPr lang="en-US"/>
           </a:p>
@@ -1013,7 +1014,7 @@
           <a:p>
             <a:fld id="{3059B378-B3A7-634A-B891-3FD0CA99752F}" type="datetimeFigureOut">
               <a:rPr lang="en-US" smtClean="0"/>
-              <a:t>8/24/17</a:t>
+              <a:t>12/8/17</a:t>
             </a:fld>
             <a:endParaRPr lang="en-US"/>
           </a:p>
@@ -1245,7 +1246,7 @@
           <a:p>
             <a:fld id="{3059B378-B3A7-634A-B891-3FD0CA99752F}" type="datetimeFigureOut">
               <a:rPr lang="en-US" smtClean="0"/>
-              <a:t>8/24/17</a:t>
+              <a:t>12/8/17</a:t>
             </a:fld>
             <a:endParaRPr lang="en-US"/>
           </a:p>
@@ -1612,7 +1613,7 @@
           <a:p>
             <a:fld id="{3059B378-B3A7-634A-B891-3FD0CA99752F}" type="datetimeFigureOut">
               <a:rPr lang="en-US" smtClean="0"/>
-              <a:t>8/24/17</a:t>
+              <a:t>12/8/17</a:t>
             </a:fld>
             <a:endParaRPr lang="en-US"/>
           </a:p>
@@ -1730,7 +1731,7 @@
           <a:p>
             <a:fld id="{3059B378-B3A7-634A-B891-3FD0CA99752F}" type="datetimeFigureOut">
               <a:rPr lang="en-US" smtClean="0"/>
-              <a:t>8/24/17</a:t>
+              <a:t>12/8/17</a:t>
             </a:fld>
             <a:endParaRPr lang="en-US"/>
           </a:p>
@@ -1825,7 +1826,7 @@
           <a:p>
             <a:fld id="{3059B378-B3A7-634A-B891-3FD0CA99752F}" type="datetimeFigureOut">
               <a:rPr lang="en-US" smtClean="0"/>
-              <a:t>8/24/17</a:t>
+              <a:t>12/8/17</a:t>
             </a:fld>
             <a:endParaRPr lang="en-US"/>
           </a:p>
@@ -2102,7 +2103,7 @@
           <a:p>
             <a:fld id="{3059B378-B3A7-634A-B891-3FD0CA99752F}" type="datetimeFigureOut">
               <a:rPr lang="en-US" smtClean="0"/>
-              <a:t>8/24/17</a:t>
+              <a:t>12/8/17</a:t>
             </a:fld>
             <a:endParaRPr lang="en-US"/>
           </a:p>
@@ -2355,7 +2356,7 @@
           <a:p>
             <a:fld id="{3059B378-B3A7-634A-B891-3FD0CA99752F}" type="datetimeFigureOut">
               <a:rPr lang="en-US" smtClean="0"/>
-              <a:t>8/24/17</a:t>
+              <a:t>12/8/17</a:t>
             </a:fld>
             <a:endParaRPr lang="en-US"/>
           </a:p>
@@ -2568,7 +2569,7 @@
           <a:p>
             <a:fld id="{3059B378-B3A7-634A-B891-3FD0CA99752F}" type="datetimeFigureOut">
               <a:rPr lang="en-US" smtClean="0"/>
-              <a:t>8/24/17</a:t>
+              <a:t>12/8/17</a:t>
             </a:fld>
             <a:endParaRPr lang="en-US"/>
           </a:p>
@@ -6943,6 +6944,567 @@
 </p:sld>
 </file>
 
+<file path=ppt/slides/slide6.xml><?xml version="1.0" encoding="utf-8"?>
+<p:sld xmlns:a="http://schemas.openxmlformats.org/drawingml/2006/main" xmlns:r="http://schemas.openxmlformats.org/officeDocument/2006/relationships" xmlns:p="http://schemas.openxmlformats.org/presentationml/2006/main">
+  <p:cSld>
+    <p:spTree>
+      <p:nvGrpSpPr>
+        <p:cNvPr id="1" name=""/>
+        <p:cNvGrpSpPr/>
+        <p:nvPr/>
+      </p:nvGrpSpPr>
+      <p:grpSpPr>
+        <a:xfrm>
+          <a:off x="0" y="0"/>
+          <a:ext cx="0" cy="0"/>
+          <a:chOff x="0" y="0"/>
+          <a:chExt cx="0" cy="0"/>
+        </a:xfrm>
+      </p:grpSpPr>
+      <p:cxnSp>
+        <p:nvCxnSpPr>
+          <p:cNvPr id="4" name="Straight Arrow Connector 3"/>
+          <p:cNvCxnSpPr/>
+          <p:nvPr/>
+        </p:nvCxnSpPr>
+        <p:spPr>
+          <a:xfrm rot="5400000">
+            <a:off x="5030248" y="2317287"/>
+            <a:ext cx="870857" cy="2818108"/>
+          </a:xfrm>
+          <a:prstGeom prst="straightConnector1">
+            <a:avLst/>
+          </a:prstGeom>
+          <a:ln w="38100">
+            <a:tailEnd type="triangle"/>
+          </a:ln>
+        </p:spPr>
+        <p:style>
+          <a:lnRef idx="1">
+            <a:schemeClr val="accent1"/>
+          </a:lnRef>
+          <a:fillRef idx="0">
+            <a:schemeClr val="accent1"/>
+          </a:fillRef>
+          <a:effectRef idx="0">
+            <a:schemeClr val="accent1"/>
+          </a:effectRef>
+          <a:fontRef idx="minor">
+            <a:schemeClr val="tx1"/>
+          </a:fontRef>
+        </p:style>
+      </p:cxnSp>
+      <p:cxnSp>
+        <p:nvCxnSpPr>
+          <p:cNvPr id="5" name="Straight Arrow Connector 4"/>
+          <p:cNvCxnSpPr/>
+          <p:nvPr/>
+        </p:nvCxnSpPr>
+        <p:spPr>
+          <a:xfrm rot="5400000" flipH="1">
+            <a:off x="5030247" y="2317287"/>
+            <a:ext cx="870857" cy="2818108"/>
+          </a:xfrm>
+          <a:prstGeom prst="straightConnector1">
+            <a:avLst/>
+          </a:prstGeom>
+          <a:ln w="38100">
+            <a:solidFill>
+              <a:srgbClr val="FF0000"/>
+            </a:solidFill>
+            <a:tailEnd type="triangle"/>
+          </a:ln>
+        </p:spPr>
+        <p:style>
+          <a:lnRef idx="1">
+            <a:schemeClr val="accent1"/>
+          </a:lnRef>
+          <a:fillRef idx="0">
+            <a:schemeClr val="accent1"/>
+          </a:fillRef>
+          <a:effectRef idx="0">
+            <a:schemeClr val="accent1"/>
+          </a:effectRef>
+          <a:fontRef idx="minor">
+            <a:schemeClr val="tx1"/>
+          </a:fontRef>
+        </p:style>
+      </p:cxnSp>
+      <p:sp>
+        <p:nvSpPr>
+          <p:cNvPr id="6" name="TextBox 5"/>
+          <p:cNvSpPr txBox="1"/>
+          <p:nvPr/>
+        </p:nvSpPr>
+        <p:spPr>
+          <a:xfrm>
+            <a:off x="3780474" y="4086395"/>
+            <a:ext cx="332142" cy="369332"/>
+          </a:xfrm>
+          <a:prstGeom prst="rect">
+            <a:avLst/>
+          </a:prstGeom>
+          <a:noFill/>
+        </p:spPr>
+        <p:txBody>
+          <a:bodyPr wrap="none" rtlCol="0">
+            <a:spAutoFit/>
+          </a:bodyPr>
+          <a:lstStyle/>
+          <a:p>
+            <a:r>
+              <a:rPr lang="en-US" smtClean="0"/>
+              <a:t>U</a:t>
+            </a:r>
+            <a:endParaRPr lang="en-US"/>
+          </a:p>
+        </p:txBody>
+      </p:sp>
+      <p:sp>
+        <p:nvSpPr>
+          <p:cNvPr id="7" name="TextBox 6"/>
+          <p:cNvSpPr txBox="1"/>
+          <p:nvPr/>
+        </p:nvSpPr>
+        <p:spPr>
+          <a:xfrm>
+            <a:off x="3780474" y="2992663"/>
+            <a:ext cx="316112" cy="369332"/>
+          </a:xfrm>
+          <a:prstGeom prst="rect">
+            <a:avLst/>
+          </a:prstGeom>
+          <a:noFill/>
+        </p:spPr>
+        <p:txBody>
+          <a:bodyPr wrap="none" rtlCol="0">
+            <a:spAutoFit/>
+          </a:bodyPr>
+          <a:lstStyle/>
+          <a:p>
+            <a:r>
+              <a:rPr lang="en-US" dirty="0" smtClean="0"/>
+              <a:t>V</a:t>
+            </a:r>
+            <a:endParaRPr lang="en-US" dirty="0"/>
+          </a:p>
+        </p:txBody>
+      </p:sp>
+      <p:sp>
+        <p:nvSpPr>
+          <p:cNvPr id="8" name="Donut 7"/>
+          <p:cNvSpPr/>
+          <p:nvPr/>
+        </p:nvSpPr>
+        <p:spPr>
+          <a:xfrm>
+            <a:off x="5299546" y="3821096"/>
+            <a:ext cx="326571" cy="326571"/>
+          </a:xfrm>
+          <a:prstGeom prst="donut">
+            <a:avLst>
+              <a:gd name="adj" fmla="val 3823"/>
+            </a:avLst>
+          </a:prstGeom>
+          <a:ln>
+            <a:solidFill>
+              <a:schemeClr val="tx1"/>
+            </a:solidFill>
+          </a:ln>
+        </p:spPr>
+        <p:style>
+          <a:lnRef idx="2">
+            <a:schemeClr val="accent1">
+              <a:shade val="50000"/>
+            </a:schemeClr>
+          </a:lnRef>
+          <a:fillRef idx="1">
+            <a:schemeClr val="accent1"/>
+          </a:fillRef>
+          <a:effectRef idx="0">
+            <a:schemeClr val="accent1"/>
+          </a:effectRef>
+          <a:fontRef idx="minor">
+            <a:schemeClr val="lt1"/>
+          </a:fontRef>
+        </p:style>
+        <p:txBody>
+          <a:bodyPr rtlCol="0" anchor="ctr"/>
+          <a:lstStyle/>
+          <a:p>
+            <a:pPr algn="ctr"/>
+            <a:endParaRPr lang="en-US">
+              <a:solidFill>
+                <a:schemeClr val="tx1"/>
+              </a:solidFill>
+            </a:endParaRPr>
+          </a:p>
+        </p:txBody>
+      </p:sp>
+      <p:cxnSp>
+        <p:nvCxnSpPr>
+          <p:cNvPr id="9" name="Straight Connector 8"/>
+          <p:cNvCxnSpPr/>
+          <p:nvPr/>
+        </p:nvCxnSpPr>
+        <p:spPr>
+          <a:xfrm>
+            <a:off x="5347371" y="3868921"/>
+            <a:ext cx="230921" cy="230921"/>
+          </a:xfrm>
+          <a:prstGeom prst="line">
+            <a:avLst/>
+          </a:prstGeom>
+          <a:ln w="38100">
+            <a:solidFill>
+              <a:schemeClr val="tx1"/>
+            </a:solidFill>
+          </a:ln>
+        </p:spPr>
+        <p:style>
+          <a:lnRef idx="1">
+            <a:schemeClr val="accent1"/>
+          </a:lnRef>
+          <a:fillRef idx="0">
+            <a:schemeClr val="accent1"/>
+          </a:fillRef>
+          <a:effectRef idx="0">
+            <a:schemeClr val="accent1"/>
+          </a:effectRef>
+          <a:fontRef idx="minor">
+            <a:schemeClr val="tx1"/>
+          </a:fontRef>
+        </p:style>
+      </p:cxnSp>
+      <p:sp>
+        <p:nvSpPr>
+          <p:cNvPr id="10" name="TextBox 9"/>
+          <p:cNvSpPr txBox="1"/>
+          <p:nvPr/>
+        </p:nvSpPr>
+        <p:spPr>
+          <a:xfrm>
+            <a:off x="5308314" y="4161770"/>
+            <a:ext cx="322242" cy="369332"/>
+          </a:xfrm>
+          <a:prstGeom prst="rect">
+            <a:avLst/>
+          </a:prstGeom>
+          <a:noFill/>
+        </p:spPr>
+        <p:txBody>
+          <a:bodyPr wrap="square" rtlCol="0">
+            <a:spAutoFit/>
+          </a:bodyPr>
+          <a:lstStyle/>
+          <a:p>
+            <a:r>
+              <a:rPr lang="en-US" dirty="0" smtClean="0"/>
+              <a:t>Z</a:t>
+            </a:r>
+            <a:endParaRPr lang="en-US" dirty="0"/>
+          </a:p>
+        </p:txBody>
+      </p:sp>
+      <p:cxnSp>
+        <p:nvCxnSpPr>
+          <p:cNvPr id="11" name="Straight Connector 10"/>
+          <p:cNvCxnSpPr/>
+          <p:nvPr/>
+        </p:nvCxnSpPr>
+        <p:spPr>
+          <a:xfrm rot="5400000">
+            <a:off x="5353975" y="3868659"/>
+            <a:ext cx="230921" cy="230921"/>
+          </a:xfrm>
+          <a:prstGeom prst="line">
+            <a:avLst/>
+          </a:prstGeom>
+          <a:ln w="38100">
+            <a:solidFill>
+              <a:schemeClr val="tx1"/>
+            </a:solidFill>
+          </a:ln>
+        </p:spPr>
+        <p:style>
+          <a:lnRef idx="1">
+            <a:schemeClr val="accent1"/>
+          </a:lnRef>
+          <a:fillRef idx="0">
+            <a:schemeClr val="accent1"/>
+          </a:fillRef>
+          <a:effectRef idx="0">
+            <a:schemeClr val="accent1"/>
+          </a:effectRef>
+          <a:fontRef idx="minor">
+            <a:schemeClr val="tx1"/>
+          </a:fontRef>
+        </p:style>
+      </p:cxnSp>
+      <p:sp>
+        <p:nvSpPr>
+          <p:cNvPr id="12" name="TextBox 11"/>
+          <p:cNvSpPr txBox="1"/>
+          <p:nvPr/>
+        </p:nvSpPr>
+        <p:spPr>
+          <a:xfrm>
+            <a:off x="4162410" y="2136435"/>
+            <a:ext cx="2614049" cy="369332"/>
+          </a:xfrm>
+          <a:prstGeom prst="rect">
+            <a:avLst/>
+          </a:prstGeom>
+          <a:noFill/>
+        </p:spPr>
+        <p:txBody>
+          <a:bodyPr wrap="none" rtlCol="0">
+            <a:spAutoFit/>
+          </a:bodyPr>
+          <a:lstStyle/>
+          <a:p>
+            <a:r>
+              <a:rPr lang="en-US" dirty="0" smtClean="0"/>
+              <a:t>New </a:t>
+            </a:r>
+            <a:r>
+              <a:rPr lang="en-US" dirty="0" err="1" smtClean="0"/>
+              <a:t>Geane</a:t>
+            </a:r>
+            <a:r>
+              <a:rPr lang="en-US" dirty="0" smtClean="0"/>
+              <a:t> </a:t>
+            </a:r>
+            <a:r>
+              <a:rPr lang="en-US" dirty="0" err="1" smtClean="0"/>
+              <a:t>Coord</a:t>
+            </a:r>
+            <a:r>
+              <a:rPr lang="en-US" dirty="0" smtClean="0"/>
+              <a:t> System</a:t>
+            </a:r>
+            <a:endParaRPr lang="en-US" dirty="0"/>
+          </a:p>
+        </p:txBody>
+      </p:sp>
+      <p:cxnSp>
+        <p:nvCxnSpPr>
+          <p:cNvPr id="13" name="Straight Arrow Connector 12"/>
+          <p:cNvCxnSpPr/>
+          <p:nvPr/>
+        </p:nvCxnSpPr>
+        <p:spPr>
+          <a:xfrm flipH="1" flipV="1">
+            <a:off x="4010565" y="3726705"/>
+            <a:ext cx="1449560" cy="4226"/>
+          </a:xfrm>
+          <a:prstGeom prst="straightConnector1">
+            <a:avLst/>
+          </a:prstGeom>
+          <a:ln w="38100">
+            <a:solidFill>
+              <a:schemeClr val="tx1"/>
+            </a:solidFill>
+            <a:tailEnd type="triangle"/>
+          </a:ln>
+        </p:spPr>
+        <p:style>
+          <a:lnRef idx="1">
+            <a:schemeClr val="accent1"/>
+          </a:lnRef>
+          <a:fillRef idx="0">
+            <a:schemeClr val="accent1"/>
+          </a:fillRef>
+          <a:effectRef idx="0">
+            <a:schemeClr val="accent1"/>
+          </a:effectRef>
+          <a:fontRef idx="minor">
+            <a:schemeClr val="tx1"/>
+          </a:fontRef>
+        </p:style>
+      </p:cxnSp>
+      <p:cxnSp>
+        <p:nvCxnSpPr>
+          <p:cNvPr id="14" name="Straight Arrow Connector 13"/>
+          <p:cNvCxnSpPr/>
+          <p:nvPr/>
+        </p:nvCxnSpPr>
+        <p:spPr>
+          <a:xfrm flipH="1" flipV="1">
+            <a:off x="5460125" y="2817417"/>
+            <a:ext cx="11108" cy="905062"/>
+          </a:xfrm>
+          <a:prstGeom prst="straightConnector1">
+            <a:avLst/>
+          </a:prstGeom>
+          <a:ln w="38100">
+            <a:solidFill>
+              <a:schemeClr val="tx1"/>
+            </a:solidFill>
+            <a:tailEnd type="triangle"/>
+          </a:ln>
+        </p:spPr>
+        <p:style>
+          <a:lnRef idx="1">
+            <a:schemeClr val="accent1"/>
+          </a:lnRef>
+          <a:fillRef idx="0">
+            <a:schemeClr val="accent1"/>
+          </a:fillRef>
+          <a:effectRef idx="0">
+            <a:schemeClr val="accent1"/>
+          </a:effectRef>
+          <a:fontRef idx="minor">
+            <a:schemeClr val="tx1"/>
+          </a:fontRef>
+        </p:style>
+      </p:cxnSp>
+      <p:sp>
+        <p:nvSpPr>
+          <p:cNvPr id="15" name="TextBox 14"/>
+          <p:cNvSpPr txBox="1"/>
+          <p:nvPr/>
+        </p:nvSpPr>
+        <p:spPr>
+          <a:xfrm>
+            <a:off x="5322795" y="2445972"/>
+            <a:ext cx="296876" cy="369332"/>
+          </a:xfrm>
+          <a:prstGeom prst="rect">
+            <a:avLst/>
+          </a:prstGeom>
+          <a:noFill/>
+        </p:spPr>
+        <p:txBody>
+          <a:bodyPr wrap="none" rtlCol="0">
+            <a:spAutoFit/>
+          </a:bodyPr>
+          <a:lstStyle/>
+          <a:p>
+            <a:r>
+              <a:rPr lang="en-US" smtClean="0"/>
+              <a:t>Y</a:t>
+            </a:r>
+            <a:endParaRPr lang="en-US"/>
+          </a:p>
+        </p:txBody>
+      </p:sp>
+      <p:sp>
+        <p:nvSpPr>
+          <p:cNvPr id="16" name="TextBox 15"/>
+          <p:cNvSpPr txBox="1"/>
+          <p:nvPr/>
+        </p:nvSpPr>
+        <p:spPr>
+          <a:xfrm>
+            <a:off x="3774443" y="3546265"/>
+            <a:ext cx="304892" cy="369332"/>
+          </a:xfrm>
+          <a:prstGeom prst="rect">
+            <a:avLst/>
+          </a:prstGeom>
+          <a:noFill/>
+        </p:spPr>
+        <p:txBody>
+          <a:bodyPr wrap="none" rtlCol="0">
+            <a:spAutoFit/>
+          </a:bodyPr>
+          <a:lstStyle/>
+          <a:p>
+            <a:r>
+              <a:rPr lang="en-US" smtClean="0"/>
+              <a:t>X</a:t>
+            </a:r>
+            <a:endParaRPr lang="en-US" dirty="0"/>
+          </a:p>
+        </p:txBody>
+      </p:sp>
+      <p:sp>
+        <p:nvSpPr>
+          <p:cNvPr id="17" name="Arc 16"/>
+          <p:cNvSpPr/>
+          <p:nvPr/>
+        </p:nvSpPr>
+        <p:spPr>
+          <a:xfrm flipH="1">
+            <a:off x="4808017" y="3557695"/>
+            <a:ext cx="143435" cy="322394"/>
+          </a:xfrm>
+          <a:prstGeom prst="arc">
+            <a:avLst/>
+          </a:prstGeom>
+          <a:ln w="38100">
+            <a:solidFill>
+              <a:schemeClr val="tx1"/>
+            </a:solidFill>
+          </a:ln>
+        </p:spPr>
+        <p:style>
+          <a:lnRef idx="1">
+            <a:schemeClr val="accent1"/>
+          </a:lnRef>
+          <a:fillRef idx="0">
+            <a:schemeClr val="accent1"/>
+          </a:fillRef>
+          <a:effectRef idx="0">
+            <a:schemeClr val="accent1"/>
+          </a:effectRef>
+          <a:fontRef idx="minor">
+            <a:schemeClr val="tx1"/>
+          </a:fontRef>
+        </p:style>
+        <p:txBody>
+          <a:bodyPr rtlCol="0" anchor="ctr"/>
+          <a:lstStyle/>
+          <a:p>
+            <a:pPr algn="ctr"/>
+            <a:endParaRPr lang="en-US"/>
+          </a:p>
+        </p:txBody>
+      </p:sp>
+      <p:sp>
+        <p:nvSpPr>
+          <p:cNvPr id="18" name="TextBox 17"/>
+          <p:cNvSpPr txBox="1"/>
+          <p:nvPr/>
+        </p:nvSpPr>
+        <p:spPr>
+          <a:xfrm>
+            <a:off x="4539458" y="3428904"/>
+            <a:ext cx="308098" cy="369332"/>
+          </a:xfrm>
+          <a:prstGeom prst="rect">
+            <a:avLst/>
+          </a:prstGeom>
+          <a:noFill/>
+        </p:spPr>
+        <p:txBody>
+          <a:bodyPr wrap="none" rtlCol="0">
+            <a:spAutoFit/>
+          </a:bodyPr>
+          <a:lstStyle/>
+          <a:p>
+            <a:r>
+              <a:rPr lang="en-US" smtClean="0"/>
+              <a:t>θ</a:t>
+            </a:r>
+            <a:endParaRPr lang="en-US" dirty="0"/>
+          </a:p>
+        </p:txBody>
+      </p:sp>
+    </p:spTree>
+    <p:extLst>
+      <p:ext uri="{BB962C8B-B14F-4D97-AF65-F5344CB8AC3E}">
+        <p14:creationId xmlns:p14="http://schemas.microsoft.com/office/powerpoint/2010/main" val="1107843752"/>
+      </p:ext>
+    </p:extLst>
+  </p:cSld>
+  <p:clrMapOvr>
+    <a:masterClrMapping/>
+  </p:clrMapOvr>
+</p:sld>
+</file>
+
 <file path=ppt/theme/theme1.xml><?xml version="1.0" encoding="utf-8"?>
 <a:theme xmlns:a="http://schemas.openxmlformats.org/drawingml/2006/main" name="Office Theme">
   <a:themeElements>

</xml_diff>